<commit_message>
internal events only and positive negative correlation separated
</commit_message>
<xml_diff>
--- a/reconcile_tree_software_design.pptx
+++ b/reconcile_tree_software_design.pptx
@@ -8292,7 +8292,7 @@
         </p:nvSpPr>
         <p:spPr>
           <a:xfrm>
-            <a:off x="12253864" y="3458449"/>
+            <a:off x="12289033" y="3493177"/>
             <a:ext cx="6538410" cy="613987"/>
           </a:xfrm>
           <a:prstGeom prst="roundRect">
@@ -8369,13 +8369,13 @@
           <p:nvPr>
             <p:extLst>
               <p:ext uri="{D42A27DB-BD31-4B8C-83A1-F6EECF244321}">
-                <p14:modId xmlns:p14="http://schemas.microsoft.com/office/powerpoint/2010/main" val="4686481"/>
+                <p14:modId xmlns:p14="http://schemas.microsoft.com/office/powerpoint/2010/main" val="2112515367"/>
               </p:ext>
             </p:extLst>
           </p:nvPr>
         </p:nvGraphicFramePr>
         <p:xfrm>
-          <a:off x="1577364" y="4336010"/>
+          <a:off x="1612533" y="4370738"/>
           <a:ext cx="17737331" cy="7268447"/>
         </p:xfrm>
         <a:graphic>
@@ -8666,7 +8666,7 @@
         </p:nvSpPr>
         <p:spPr>
           <a:xfrm>
-            <a:off x="6785384" y="11062823"/>
+            <a:off x="6820553" y="11097551"/>
             <a:ext cx="2871536" cy="487305"/>
           </a:xfrm>
           <a:prstGeom prst="upArrowCallout">
@@ -8865,7 +8865,7 @@
         </p:nvSpPr>
         <p:spPr>
           <a:xfrm>
-            <a:off x="8020261" y="10019225"/>
+            <a:off x="8055430" y="10053953"/>
             <a:ext cx="4107592" cy="611076"/>
           </a:xfrm>
           <a:prstGeom prst="upArrowCallout">
@@ -8940,7 +8940,7 @@
         </p:nvSpPr>
         <p:spPr>
           <a:xfrm>
-            <a:off x="8778146" y="8726618"/>
+            <a:off x="8813315" y="8761346"/>
             <a:ext cx="5514605" cy="636902"/>
           </a:xfrm>
           <a:prstGeom prst="upArrowCallout">
@@ -9015,7 +9015,7 @@
         </p:nvSpPr>
         <p:spPr>
           <a:xfrm>
-            <a:off x="9033018" y="7624124"/>
+            <a:off x="9068187" y="7658852"/>
             <a:ext cx="5004863" cy="636902"/>
           </a:xfrm>
           <a:prstGeom prst="upArrowCallout">
@@ -9106,7 +9106,7 @@
         </p:nvSpPr>
         <p:spPr>
           <a:xfrm>
-            <a:off x="10949672" y="6332333"/>
+            <a:off x="10984841" y="6367061"/>
             <a:ext cx="5514605" cy="575117"/>
           </a:xfrm>
           <a:prstGeom prst="upArrowCallout">
@@ -9173,7 +9173,7 @@
         </p:nvSpPr>
         <p:spPr>
           <a:xfrm>
-            <a:off x="11917933" y="5111289"/>
+            <a:off x="11953102" y="5146017"/>
             <a:ext cx="4239897" cy="578545"/>
           </a:xfrm>
           <a:prstGeom prst="upArrowCallout">
@@ -9380,7 +9380,7 @@
         </p:nvSpPr>
         <p:spPr>
           <a:xfrm>
-            <a:off x="13663246" y="3992555"/>
+            <a:off x="13698415" y="4027283"/>
             <a:ext cx="3719646" cy="578545"/>
           </a:xfrm>
           <a:prstGeom prst="upArrowCallout">
@@ -9536,7 +9536,7 @@
         </p:nvSpPr>
         <p:spPr>
           <a:xfrm>
-            <a:off x="15993887" y="5740820"/>
+            <a:off x="16029056" y="5775548"/>
             <a:ext cx="3009401" cy="879071"/>
           </a:xfrm>
           <a:prstGeom prst="leftArrowCallout">

</xml_diff>